<commit_message>
smaller adaptions based on reviews
</commit_message>
<xml_diff>
--- a/images/PK-Sim_PBPK_generic_model_scheme.pptx
+++ b/images/PK-Sim_PBPK_generic_model_scheme.pptx
@@ -104,6 +104,11 @@
       </a:defRPr>
     </a:lvl9pPr>
   </p:defaultTextStyle>
+  <p:extLst>
+    <p:ext uri="{EFAFB233-063F-42B5-8137-9DF3F51BA10A}">
+      <p15:sldGuideLst xmlns:p15="http://schemas.microsoft.com/office/powerpoint/2012/main"/>
+    </p:ext>
+  </p:extLst>
 </p:presentation>
 </file>
 
@@ -4436,7 +4441,7 @@
         </p:nvGrpSpPr>
         <p:grpSpPr>
           <a:xfrm>
-            <a:off x="232954" y="361857"/>
+            <a:off x="349635" y="414244"/>
             <a:ext cx="8354242" cy="8636187"/>
             <a:chOff x="214971" y="478569"/>
             <a:chExt cx="8354242" cy="8636187"/>
@@ -6218,7 +6223,7 @@
                 <a:avLst/>
               </a:prstGeom>
               <a:solidFill>
-                <a:srgbClr val="FFE07D"/>
+                <a:srgbClr val="FFC000"/>
               </a:solidFill>
               <a:ln w="12700">
                 <a:solidFill>
@@ -6944,12 +6949,12 @@
             </p:nvCxnSpPr>
             <p:spPr>
               <a:xfrm rot="10800000">
-                <a:off x="2321662" y="1970130"/>
-                <a:ext cx="1502473" cy="2433109"/>
+                <a:off x="2321661" y="1970130"/>
+                <a:ext cx="1896653" cy="2433110"/>
               </a:xfrm>
               <a:prstGeom prst="bentConnector3">
                 <a:avLst>
-                  <a:gd name="adj1" fmla="val 135502"/>
+                  <a:gd name="adj1" fmla="val 128967"/>
                 </a:avLst>
               </a:prstGeom>
               <a:ln w="28575">
@@ -6988,8 +6993,8 @@
             </p:nvSpPr>
             <p:spPr>
               <a:xfrm>
-                <a:off x="3824134" y="4187238"/>
-                <a:ext cx="1512000" cy="432000"/>
+                <a:off x="4218314" y="4187238"/>
+                <a:ext cx="937270" cy="432000"/>
               </a:xfrm>
               <a:prstGeom prst="roundRect">
                 <a:avLst>
@@ -6997,7 +7002,7 @@
                 </a:avLst>
               </a:prstGeom>
               <a:solidFill>
-                <a:schemeClr val="bg1"/>
+                <a:srgbClr val="00B050"/>
               </a:solidFill>
               <a:ln w="12700">
                 <a:solidFill>
@@ -7037,14 +7042,14 @@
               <a:p>
                 <a:pPr algn="ctr"/>
                 <a:r>
-                  <a:rPr lang="en-US" sz="1701" b="1" dirty="0">
+                  <a:rPr lang="en-US" sz="1320" b="1" dirty="0">
                     <a:solidFill>
-                      <a:schemeClr val="tx1"/>
+                      <a:schemeClr val="bg1"/>
                     </a:solidFill>
                     <a:latin typeface="Bahnschrift" panose="020B0502040204020203" pitchFamily="34" charset="0"/>
                     <a:cs typeface="Biome" panose="020B0502040204020203" pitchFamily="34" charset="0"/>
                   </a:rPr>
-                  <a:t>Gall Bladder</a:t>
+                  <a:t>Gall-bladder</a:t>
                 </a:r>
               </a:p>
             </p:txBody>
@@ -7138,7 +7143,7 @@
             </p:nvSpPr>
             <p:spPr>
               <a:xfrm>
-                <a:off x="4065523" y="3950953"/>
+                <a:off x="4262559" y="4034714"/>
                 <a:ext cx="180000" cy="360000"/>
               </a:xfrm>
               <a:prstGeom prst="downArrow">
@@ -7967,7 +7972,7 @@
               <a:lstStyle/>
               <a:p>
                 <a:pPr algn="ctr"/>
-                <a:endParaRPr lang="en-US" sz="1701" b="1">
+                <a:endParaRPr lang="en-US" sz="1701" b="1" dirty="0">
                   <a:solidFill>
                     <a:schemeClr val="tx1"/>
                   </a:solidFill>

</xml_diff>

<commit_message>
add "Met." to metabolism arrows
</commit_message>
<xml_diff>
--- a/images/PK-Sim_PBPK_generic_model_scheme.pptx
+++ b/images/PK-Sim_PBPK_generic_model_scheme.pptx
@@ -1699,7 +1699,7 @@
           <a:p>
             <a:fld id="{712C03AC-03AF-4641-A632-8C2842B8459B}" type="datetimeFigureOut">
               <a:rPr lang="en-US" smtClean="0"/>
-              <a:t>10/15/2021</a:t>
+              <a:t>11/2/2021</a:t>
             </a:fld>
             <a:endParaRPr lang="en-US"/>
           </a:p>
@@ -1869,7 +1869,7 @@
           <a:p>
             <a:fld id="{712C03AC-03AF-4641-A632-8C2842B8459B}" type="datetimeFigureOut">
               <a:rPr lang="en-US" smtClean="0"/>
-              <a:t>10/15/2021</a:t>
+              <a:t>11/2/2021</a:t>
             </a:fld>
             <a:endParaRPr lang="en-US"/>
           </a:p>
@@ -2049,7 +2049,7 @@
           <a:p>
             <a:fld id="{712C03AC-03AF-4641-A632-8C2842B8459B}" type="datetimeFigureOut">
               <a:rPr lang="en-US" smtClean="0"/>
-              <a:t>10/15/2021</a:t>
+              <a:t>11/2/2021</a:t>
             </a:fld>
             <a:endParaRPr lang="en-US"/>
           </a:p>
@@ -2219,7 +2219,7 @@
           <a:p>
             <a:fld id="{712C03AC-03AF-4641-A632-8C2842B8459B}" type="datetimeFigureOut">
               <a:rPr lang="en-US" smtClean="0"/>
-              <a:t>10/15/2021</a:t>
+              <a:t>11/2/2021</a:t>
             </a:fld>
             <a:endParaRPr lang="en-US"/>
           </a:p>
@@ -2463,7 +2463,7 @@
           <a:p>
             <a:fld id="{712C03AC-03AF-4641-A632-8C2842B8459B}" type="datetimeFigureOut">
               <a:rPr lang="en-US" smtClean="0"/>
-              <a:t>10/15/2021</a:t>
+              <a:t>11/2/2021</a:t>
             </a:fld>
             <a:endParaRPr lang="en-US"/>
           </a:p>
@@ -2695,7 +2695,7 @@
           <a:p>
             <a:fld id="{712C03AC-03AF-4641-A632-8C2842B8459B}" type="datetimeFigureOut">
               <a:rPr lang="en-US" smtClean="0"/>
-              <a:t>10/15/2021</a:t>
+              <a:t>11/2/2021</a:t>
             </a:fld>
             <a:endParaRPr lang="en-US"/>
           </a:p>
@@ -3062,7 +3062,7 @@
           <a:p>
             <a:fld id="{712C03AC-03AF-4641-A632-8C2842B8459B}" type="datetimeFigureOut">
               <a:rPr lang="en-US" smtClean="0"/>
-              <a:t>10/15/2021</a:t>
+              <a:t>11/2/2021</a:t>
             </a:fld>
             <a:endParaRPr lang="en-US"/>
           </a:p>
@@ -3180,7 +3180,7 @@
           <a:p>
             <a:fld id="{712C03AC-03AF-4641-A632-8C2842B8459B}" type="datetimeFigureOut">
               <a:rPr lang="en-US" smtClean="0"/>
-              <a:t>10/15/2021</a:t>
+              <a:t>11/2/2021</a:t>
             </a:fld>
             <a:endParaRPr lang="en-US"/>
           </a:p>
@@ -3275,7 +3275,7 @@
           <a:p>
             <a:fld id="{712C03AC-03AF-4641-A632-8C2842B8459B}" type="datetimeFigureOut">
               <a:rPr lang="en-US" smtClean="0"/>
-              <a:t>10/15/2021</a:t>
+              <a:t>11/2/2021</a:t>
             </a:fld>
             <a:endParaRPr lang="en-US"/>
           </a:p>
@@ -3552,7 +3552,7 @@
           <a:p>
             <a:fld id="{712C03AC-03AF-4641-A632-8C2842B8459B}" type="datetimeFigureOut">
               <a:rPr lang="en-US" smtClean="0"/>
-              <a:t>10/15/2021</a:t>
+              <a:t>11/2/2021</a:t>
             </a:fld>
             <a:endParaRPr lang="en-US"/>
           </a:p>
@@ -3809,7 +3809,7 @@
           <a:p>
             <a:fld id="{712C03AC-03AF-4641-A632-8C2842B8459B}" type="datetimeFigureOut">
               <a:rPr lang="en-US" smtClean="0"/>
-              <a:t>10/15/2021</a:t>
+              <a:t>11/2/2021</a:t>
             </a:fld>
             <a:endParaRPr lang="en-US"/>
           </a:p>
@@ -4022,7 +4022,7 @@
           <a:p>
             <a:fld id="{712C03AC-03AF-4641-A632-8C2842B8459B}" type="datetimeFigureOut">
               <a:rPr lang="en-US" smtClean="0"/>
-              <a:t>10/15/2021</a:t>
+              <a:t>11/2/2021</a:t>
             </a:fld>
             <a:endParaRPr lang="en-US"/>
           </a:p>
@@ -4441,7 +4441,7 @@
         </p:nvGrpSpPr>
         <p:grpSpPr>
           <a:xfrm>
-            <a:off x="349635" y="414244"/>
+            <a:off x="363922" y="409482"/>
             <a:ext cx="8354242" cy="8636187"/>
             <a:chOff x="214971" y="478569"/>
             <a:chExt cx="8354242" cy="8636187"/>
@@ -8508,6 +8508,345 @@
           </p:txBody>
         </p:sp>
       </p:grpSp>
+      <p:sp>
+        <p:nvSpPr>
+          <p:cNvPr id="3" name="Rechteck 2">
+            <a:extLst>
+              <a:ext uri="{FF2B5EF4-FFF2-40B4-BE49-F238E27FC236}">
+                <a16:creationId xmlns:a16="http://schemas.microsoft.com/office/drawing/2014/main" id="{E1480084-0EC6-4DF2-A770-88A11586DBB2}"/>
+              </a:ext>
+            </a:extLst>
+          </p:cNvPr>
+          <p:cNvSpPr/>
+          <p:nvPr/>
+        </p:nvSpPr>
+        <p:spPr>
+          <a:xfrm rot="17273585">
+            <a:off x="6066239" y="1686524"/>
+            <a:ext cx="562263" cy="597996"/>
+          </a:xfrm>
+          <a:prstGeom prst="rect">
+            <a:avLst/>
+          </a:prstGeom>
+          <a:noFill/>
+        </p:spPr>
+        <p:txBody>
+          <a:bodyPr wrap="none" lIns="91440" tIns="45720" rIns="91440" bIns="45720">
+            <a:prstTxWarp prst="textArchUp">
+              <a:avLst>
+                <a:gd name="adj" fmla="val 13694428"/>
+              </a:avLst>
+            </a:prstTxWarp>
+            <a:spAutoFit/>
+          </a:bodyPr>
+          <a:lstStyle/>
+          <a:p>
+            <a:pPr algn="ctr"/>
+            <a:r>
+              <a:rPr lang="de-DE" sz="1200" b="0" cap="none" spc="0" dirty="0">
+                <a:ln w="0"/>
+                <a:solidFill>
+                  <a:schemeClr val="tx1">
+                    <a:lumMod val="85000"/>
+                    <a:lumOff val="15000"/>
+                  </a:schemeClr>
+                </a:solidFill>
+                <a:effectLst>
+                  <a:outerShdw blurRad="38100" dist="19050" dir="2700000" algn="tl" rotWithShape="0">
+                    <a:schemeClr val="dk1">
+                      <a:alpha val="40000"/>
+                    </a:schemeClr>
+                  </a:outerShdw>
+                </a:effectLst>
+              </a:rPr>
+              <a:t>M</a:t>
+            </a:r>
+            <a:r>
+              <a:rPr lang="de-DE" sz="1100" b="0" cap="none" spc="0" dirty="0">
+                <a:ln w="0"/>
+                <a:solidFill>
+                  <a:schemeClr val="tx1">
+                    <a:lumMod val="85000"/>
+                    <a:lumOff val="15000"/>
+                  </a:schemeClr>
+                </a:solidFill>
+                <a:effectLst>
+                  <a:outerShdw blurRad="38100" dist="19050" dir="2700000" algn="tl" rotWithShape="0">
+                    <a:schemeClr val="dk1">
+                      <a:alpha val="40000"/>
+                    </a:schemeClr>
+                  </a:outerShdw>
+                </a:effectLst>
+              </a:rPr>
+              <a:t>e</a:t>
+            </a:r>
+            <a:r>
+              <a:rPr lang="de-DE" sz="1000" b="0" cap="none" spc="0" dirty="0">
+                <a:ln w="0"/>
+                <a:solidFill>
+                  <a:schemeClr val="tx1">
+                    <a:lumMod val="85000"/>
+                    <a:lumOff val="15000"/>
+                  </a:schemeClr>
+                </a:solidFill>
+                <a:effectLst>
+                  <a:outerShdw blurRad="38100" dist="19050" dir="2700000" algn="tl" rotWithShape="0">
+                    <a:schemeClr val="dk1">
+                      <a:alpha val="40000"/>
+                    </a:schemeClr>
+                  </a:outerShdw>
+                </a:effectLst>
+              </a:rPr>
+              <a:t>t</a:t>
+            </a:r>
+            <a:r>
+              <a:rPr lang="de-DE" sz="1200" b="0" cap="none" spc="0" dirty="0">
+                <a:ln w="0"/>
+                <a:solidFill>
+                  <a:schemeClr val="tx1">
+                    <a:lumMod val="85000"/>
+                    <a:lumOff val="15000"/>
+                  </a:schemeClr>
+                </a:solidFill>
+                <a:effectLst>
+                  <a:outerShdw blurRad="38100" dist="19050" dir="2700000" algn="tl" rotWithShape="0">
+                    <a:schemeClr val="dk1">
+                      <a:alpha val="40000"/>
+                    </a:schemeClr>
+                  </a:outerShdw>
+                </a:effectLst>
+              </a:rPr>
+              <a:t>.</a:t>
+            </a:r>
+          </a:p>
+        </p:txBody>
+      </p:sp>
+      <p:sp>
+        <p:nvSpPr>
+          <p:cNvPr id="78" name="Rechteck 77">
+            <a:extLst>
+              <a:ext uri="{FF2B5EF4-FFF2-40B4-BE49-F238E27FC236}">
+                <a16:creationId xmlns:a16="http://schemas.microsoft.com/office/drawing/2014/main" id="{1AE0D0B7-70DA-4DBD-86A6-95EE76048F4D}"/>
+              </a:ext>
+            </a:extLst>
+          </p:cNvPr>
+          <p:cNvSpPr/>
+          <p:nvPr/>
+        </p:nvSpPr>
+        <p:spPr>
+          <a:xfrm rot="17273585">
+            <a:off x="7477943" y="3604680"/>
+            <a:ext cx="562263" cy="597996"/>
+          </a:xfrm>
+          <a:prstGeom prst="rect">
+            <a:avLst/>
+          </a:prstGeom>
+          <a:noFill/>
+        </p:spPr>
+        <p:txBody>
+          <a:bodyPr wrap="none" lIns="91440" tIns="45720" rIns="91440" bIns="45720">
+            <a:prstTxWarp prst="textArchUp">
+              <a:avLst>
+                <a:gd name="adj" fmla="val 13694428"/>
+              </a:avLst>
+            </a:prstTxWarp>
+            <a:spAutoFit/>
+          </a:bodyPr>
+          <a:lstStyle/>
+          <a:p>
+            <a:pPr algn="ctr"/>
+            <a:r>
+              <a:rPr lang="de-DE" sz="1200" b="0" cap="none" spc="0" dirty="0">
+                <a:ln w="0"/>
+                <a:solidFill>
+                  <a:schemeClr val="tx1">
+                    <a:lumMod val="85000"/>
+                    <a:lumOff val="15000"/>
+                  </a:schemeClr>
+                </a:solidFill>
+                <a:effectLst>
+                  <a:outerShdw blurRad="38100" dist="19050" dir="2700000" algn="tl" rotWithShape="0">
+                    <a:schemeClr val="dk1">
+                      <a:alpha val="40000"/>
+                    </a:schemeClr>
+                  </a:outerShdw>
+                </a:effectLst>
+              </a:rPr>
+              <a:t>M</a:t>
+            </a:r>
+            <a:r>
+              <a:rPr lang="de-DE" sz="1100" b="0" cap="none" spc="0" dirty="0">
+                <a:ln w="0"/>
+                <a:solidFill>
+                  <a:schemeClr val="tx1">
+                    <a:lumMod val="85000"/>
+                    <a:lumOff val="15000"/>
+                  </a:schemeClr>
+                </a:solidFill>
+                <a:effectLst>
+                  <a:outerShdw blurRad="38100" dist="19050" dir="2700000" algn="tl" rotWithShape="0">
+                    <a:schemeClr val="dk1">
+                      <a:alpha val="40000"/>
+                    </a:schemeClr>
+                  </a:outerShdw>
+                </a:effectLst>
+              </a:rPr>
+              <a:t>e</a:t>
+            </a:r>
+            <a:r>
+              <a:rPr lang="de-DE" sz="1000" b="0" cap="none" spc="0" dirty="0">
+                <a:ln w="0"/>
+                <a:solidFill>
+                  <a:schemeClr val="tx1">
+                    <a:lumMod val="85000"/>
+                    <a:lumOff val="15000"/>
+                  </a:schemeClr>
+                </a:solidFill>
+                <a:effectLst>
+                  <a:outerShdw blurRad="38100" dist="19050" dir="2700000" algn="tl" rotWithShape="0">
+                    <a:schemeClr val="dk1">
+                      <a:alpha val="40000"/>
+                    </a:schemeClr>
+                  </a:outerShdw>
+                </a:effectLst>
+              </a:rPr>
+              <a:t>t</a:t>
+            </a:r>
+            <a:r>
+              <a:rPr lang="de-DE" sz="1200" b="0" cap="none" spc="0" dirty="0">
+                <a:ln w="0"/>
+                <a:solidFill>
+                  <a:schemeClr val="tx1">
+                    <a:lumMod val="85000"/>
+                    <a:lumOff val="15000"/>
+                  </a:schemeClr>
+                </a:solidFill>
+                <a:effectLst>
+                  <a:outerShdw blurRad="38100" dist="19050" dir="2700000" algn="tl" rotWithShape="0">
+                    <a:schemeClr val="dk1">
+                      <a:alpha val="40000"/>
+                    </a:schemeClr>
+                  </a:outerShdw>
+                </a:effectLst>
+              </a:rPr>
+              <a:t>.</a:t>
+            </a:r>
+          </a:p>
+        </p:txBody>
+      </p:sp>
+      <p:sp>
+        <p:nvSpPr>
+          <p:cNvPr id="79" name="Rechteck 78">
+            <a:extLst>
+              <a:ext uri="{FF2B5EF4-FFF2-40B4-BE49-F238E27FC236}">
+                <a16:creationId xmlns:a16="http://schemas.microsoft.com/office/drawing/2014/main" id="{F4682E60-D9EE-4648-A355-8DB2B729708C}"/>
+              </a:ext>
+            </a:extLst>
+          </p:cNvPr>
+          <p:cNvSpPr/>
+          <p:nvPr/>
+        </p:nvSpPr>
+        <p:spPr>
+          <a:xfrm rot="17273585">
+            <a:off x="6750774" y="7341890"/>
+            <a:ext cx="562263" cy="597996"/>
+          </a:xfrm>
+          <a:prstGeom prst="rect">
+            <a:avLst/>
+          </a:prstGeom>
+          <a:noFill/>
+        </p:spPr>
+        <p:txBody>
+          <a:bodyPr wrap="none" lIns="91440" tIns="45720" rIns="91440" bIns="45720">
+            <a:prstTxWarp prst="textArchUp">
+              <a:avLst>
+                <a:gd name="adj" fmla="val 13694428"/>
+              </a:avLst>
+            </a:prstTxWarp>
+            <a:spAutoFit/>
+          </a:bodyPr>
+          <a:lstStyle/>
+          <a:p>
+            <a:pPr algn="ctr"/>
+            <a:r>
+              <a:rPr lang="de-DE" sz="1200" b="0" cap="none" spc="0" dirty="0">
+                <a:ln w="0"/>
+                <a:solidFill>
+                  <a:schemeClr val="tx1">
+                    <a:lumMod val="85000"/>
+                    <a:lumOff val="15000"/>
+                  </a:schemeClr>
+                </a:solidFill>
+                <a:effectLst>
+                  <a:outerShdw blurRad="38100" dist="19050" dir="2700000" algn="tl" rotWithShape="0">
+                    <a:schemeClr val="dk1">
+                      <a:alpha val="40000"/>
+                    </a:schemeClr>
+                  </a:outerShdw>
+                </a:effectLst>
+              </a:rPr>
+              <a:t>M</a:t>
+            </a:r>
+            <a:r>
+              <a:rPr lang="de-DE" sz="1100" b="0" cap="none" spc="0" dirty="0">
+                <a:ln w="0"/>
+                <a:solidFill>
+                  <a:schemeClr val="tx1">
+                    <a:lumMod val="85000"/>
+                    <a:lumOff val="15000"/>
+                  </a:schemeClr>
+                </a:solidFill>
+                <a:effectLst>
+                  <a:outerShdw blurRad="38100" dist="19050" dir="2700000" algn="tl" rotWithShape="0">
+                    <a:schemeClr val="dk1">
+                      <a:alpha val="40000"/>
+                    </a:schemeClr>
+                  </a:outerShdw>
+                </a:effectLst>
+              </a:rPr>
+              <a:t>e</a:t>
+            </a:r>
+            <a:r>
+              <a:rPr lang="de-DE" sz="1000" b="0" cap="none" spc="0" dirty="0">
+                <a:ln w="0"/>
+                <a:solidFill>
+                  <a:schemeClr val="tx1">
+                    <a:lumMod val="85000"/>
+                    <a:lumOff val="15000"/>
+                  </a:schemeClr>
+                </a:solidFill>
+                <a:effectLst>
+                  <a:outerShdw blurRad="38100" dist="19050" dir="2700000" algn="tl" rotWithShape="0">
+                    <a:schemeClr val="dk1">
+                      <a:alpha val="40000"/>
+                    </a:schemeClr>
+                  </a:outerShdw>
+                </a:effectLst>
+              </a:rPr>
+              <a:t>t</a:t>
+            </a:r>
+            <a:r>
+              <a:rPr lang="de-DE" sz="1200" b="0" cap="none" spc="0" dirty="0">
+                <a:ln w="0"/>
+                <a:solidFill>
+                  <a:schemeClr val="tx1">
+                    <a:lumMod val="85000"/>
+                    <a:lumOff val="15000"/>
+                  </a:schemeClr>
+                </a:solidFill>
+                <a:effectLst>
+                  <a:outerShdw blurRad="38100" dist="19050" dir="2700000" algn="tl" rotWithShape="0">
+                    <a:schemeClr val="dk1">
+                      <a:alpha val="40000"/>
+                    </a:schemeClr>
+                  </a:outerShdw>
+                </a:effectLst>
+              </a:rPr>
+              <a:t>.</a:t>
+            </a:r>
+          </a:p>
+        </p:txBody>
+      </p:sp>
     </p:spTree>
     <p:extLst>
       <p:ext uri="{BB962C8B-B14F-4D97-AF65-F5344CB8AC3E}">

</xml_diff>